<commit_message>
added requirement specifikation to slides
</commit_message>
<xml_diff>
--- a/docs/præsentation.pptx
+++ b/docs/præsentation.pptx
@@ -8,9 +8,10 @@
     <p:sldId id="256" r:id="rId2"/>
     <p:sldId id="260" r:id="rId3"/>
     <p:sldId id="257" r:id="rId4"/>
-    <p:sldId id="258" r:id="rId5"/>
-    <p:sldId id="259" r:id="rId6"/>
-    <p:sldId id="261" r:id="rId7"/>
+    <p:sldId id="262" r:id="rId5"/>
+    <p:sldId id="258" r:id="rId6"/>
+    <p:sldId id="259" r:id="rId7"/>
+    <p:sldId id="261" r:id="rId8"/>
   </p:sldIdLst>
   <p:sldSz cx="12192000" cy="6858000"/>
   <p:notesSz cx="6858000" cy="9144000"/>
@@ -109,6 +110,11 @@
       </a:defRPr>
     </a:lvl9pPr>
   </p:defaultTextStyle>
+  <p:extLst>
+    <p:ext uri="{EFAFB233-063F-42B5-8137-9DF3F51BA10A}">
+      <p15:sldGuideLst xmlns:p15="http://schemas.microsoft.com/office/powerpoint/2012/main"/>
+    </p:ext>
+  </p:extLst>
 </p:presentation>
 </file>
 
@@ -4228,7 +4234,7 @@
           <a:p>
             <a:r>
               <a:rPr lang="da-DK" dirty="0"/>
-              <a:t>Analyse</a:t>
+              <a:t>Undersøgelse</a:t>
             </a:r>
           </a:p>
         </p:txBody>
@@ -4295,36 +4301,6 @@
               <a:rPr lang="da-DK" dirty="0" err="1"/>
               <a:t>state</a:t>
             </a:r>
-            <a:endParaRPr lang="da-DK" dirty="0"/>
-          </a:p>
-          <a:p>
-            <a:r>
-              <a:rPr lang="da-DK" dirty="0"/>
-              <a:t>Udarbejdelse af kravspecifikation</a:t>
-            </a:r>
-          </a:p>
-          <a:p>
-            <a:pPr lvl="1"/>
-            <a:r>
-              <a:rPr lang="da-DK" dirty="0"/>
-              <a:t>Fokus på at dække så meget som muligt</a:t>
-            </a:r>
-          </a:p>
-          <a:p>
-            <a:pPr lvl="1"/>
-            <a:r>
-              <a:rPr lang="da-DK" dirty="0"/>
-              <a:t>Udeladelse af unødvendige features</a:t>
-            </a:r>
-          </a:p>
-          <a:p>
-            <a:pPr lvl="1"/>
-            <a:r>
-              <a:rPr lang="da-DK" dirty="0"/>
-              <a:t>Tilføjelse vigtige krav selv hvis de ikke kan nås</a:t>
-            </a:r>
-          </a:p>
-          <a:p>
             <a:endParaRPr lang="da-DK" dirty="0"/>
           </a:p>
         </p:txBody>
@@ -4364,7 +4340,7 @@
           <p:cNvPr id="2" name="Titel 1">
             <a:extLst>
               <a:ext uri="{FF2B5EF4-FFF2-40B4-BE49-F238E27FC236}">
-                <a16:creationId xmlns:a16="http://schemas.microsoft.com/office/drawing/2014/main" id="{01492D0A-5EDA-84C7-93F9-33CF5E0C9383}"/>
+                <a16:creationId xmlns:a16="http://schemas.microsoft.com/office/drawing/2014/main" id="{9C9E30D4-4F24-CD7D-D5F9-C258B35E7BD4}"/>
               </a:ext>
             </a:extLst>
           </p:cNvPr>
@@ -4382,7 +4358,7 @@
           <a:p>
             <a:r>
               <a:rPr lang="da-DK" dirty="0"/>
-              <a:t>Planlægning</a:t>
+              <a:t>Kravspecifikation</a:t>
             </a:r>
           </a:p>
         </p:txBody>
@@ -4392,7 +4368,7 @@
           <p:cNvPr id="3" name="Pladsholder til indhold 2">
             <a:extLst>
               <a:ext uri="{FF2B5EF4-FFF2-40B4-BE49-F238E27FC236}">
-                <a16:creationId xmlns:a16="http://schemas.microsoft.com/office/drawing/2014/main" id="{817AB306-DC42-2D6A-CB66-5691E1713BCD}"/>
+                <a16:creationId xmlns:a16="http://schemas.microsoft.com/office/drawing/2014/main" id="{5C9BBEAC-5698-573F-8840-6F54282EB5F5}"/>
               </a:ext>
             </a:extLst>
           </p:cNvPr>
@@ -4403,40 +4379,40 @@
             <p:ph idx="1"/>
           </p:nvPr>
         </p:nvSpPr>
-        <p:spPr/>
+        <p:spPr>
+          <a:xfrm>
+            <a:off x="1371600" y="2286000"/>
+            <a:ext cx="4653815" cy="3581400"/>
+          </a:xfrm>
+        </p:spPr>
         <p:txBody>
           <a:bodyPr/>
           <a:lstStyle/>
           <a:p>
             <a:r>
               <a:rPr lang="da-DK" dirty="0"/>
-              <a:t>Spil logik og validering</a:t>
-            </a:r>
-          </a:p>
-          <a:p>
+              <a:t>Udarbejdelse af kravspecifikation</a:t>
+            </a:r>
+          </a:p>
+          <a:p>
+            <a:pPr lvl="1"/>
             <a:r>
               <a:rPr lang="da-DK" dirty="0"/>
-              <a:t>Brugergrænseflade</a:t>
-            </a:r>
-          </a:p>
-          <a:p>
+              <a:t>Fokus på at dække så meget som muligt</a:t>
+            </a:r>
+          </a:p>
+          <a:p>
+            <a:pPr lvl="1"/>
             <a:r>
               <a:rPr lang="da-DK" dirty="0"/>
-              <a:t>Visuel feedback</a:t>
-            </a:r>
-          </a:p>
-          <a:p>
+              <a:t>Udeladelse af unødvendige features</a:t>
+            </a:r>
+          </a:p>
+          <a:p>
+            <a:pPr lvl="1"/>
             <a:r>
               <a:rPr lang="da-DK" dirty="0"/>
-              <a:t>Opbevare spillets </a:t>
-            </a:r>
-            <a:r>
-              <a:rPr lang="da-DK" dirty="0" err="1"/>
-              <a:t>state</a:t>
-            </a:r>
-            <a:r>
-              <a:rPr lang="da-DK" dirty="0"/>
-              <a:t> så det kan geninitialiseres</a:t>
+              <a:t>Tilføjelse vigtige krav selv hvis de ikke kan nås</a:t>
             </a:r>
           </a:p>
           <a:p>
@@ -4444,10 +4420,40 @@
           </a:p>
         </p:txBody>
       </p:sp>
+      <p:pic>
+        <p:nvPicPr>
+          <p:cNvPr id="9" name="Billede 8">
+            <a:extLst>
+              <a:ext uri="{FF2B5EF4-FFF2-40B4-BE49-F238E27FC236}">
+                <a16:creationId xmlns:a16="http://schemas.microsoft.com/office/drawing/2014/main" id="{C1B49A8F-5730-50BE-152A-6C9FF1ADE338}"/>
+              </a:ext>
+            </a:extLst>
+          </p:cNvPr>
+          <p:cNvPicPr>
+            <a:picLocks noChangeAspect="1"/>
+          </p:cNvPicPr>
+          <p:nvPr/>
+        </p:nvPicPr>
+        <p:blipFill>
+          <a:blip r:embed="rId2"/>
+          <a:stretch>
+            <a:fillRect/>
+          </a:stretch>
+        </p:blipFill>
+        <p:spPr>
+          <a:xfrm>
+            <a:off x="6166587" y="2267056"/>
+            <a:ext cx="5202711" cy="3581401"/>
+          </a:xfrm>
+          <a:prstGeom prst="rect">
+            <a:avLst/>
+          </a:prstGeom>
+        </p:spPr>
+      </p:pic>
     </p:spTree>
     <p:extLst>
       <p:ext uri="{BB962C8B-B14F-4D97-AF65-F5344CB8AC3E}">
-        <p14:creationId xmlns:p14="http://schemas.microsoft.com/office/powerpoint/2010/main" val="3038215000"/>
+        <p14:creationId xmlns:p14="http://schemas.microsoft.com/office/powerpoint/2010/main" val="568693251"/>
       </p:ext>
     </p:extLst>
   </p:cSld>
@@ -4479,6 +4485,121 @@
           <p:cNvPr id="2" name="Titel 1">
             <a:extLst>
               <a:ext uri="{FF2B5EF4-FFF2-40B4-BE49-F238E27FC236}">
+                <a16:creationId xmlns:a16="http://schemas.microsoft.com/office/drawing/2014/main" id="{01492D0A-5EDA-84C7-93F9-33CF5E0C9383}"/>
+              </a:ext>
+            </a:extLst>
+          </p:cNvPr>
+          <p:cNvSpPr>
+            <a:spLocks noGrp="1"/>
+          </p:cNvSpPr>
+          <p:nvPr>
+            <p:ph type="title"/>
+          </p:nvPr>
+        </p:nvSpPr>
+        <p:spPr/>
+        <p:txBody>
+          <a:bodyPr/>
+          <a:lstStyle/>
+          <a:p>
+            <a:r>
+              <a:rPr lang="da-DK" dirty="0"/>
+              <a:t>Planlægning</a:t>
+            </a:r>
+          </a:p>
+        </p:txBody>
+      </p:sp>
+      <p:sp>
+        <p:nvSpPr>
+          <p:cNvPr id="3" name="Pladsholder til indhold 2">
+            <a:extLst>
+              <a:ext uri="{FF2B5EF4-FFF2-40B4-BE49-F238E27FC236}">
+                <a16:creationId xmlns:a16="http://schemas.microsoft.com/office/drawing/2014/main" id="{817AB306-DC42-2D6A-CB66-5691E1713BCD}"/>
+              </a:ext>
+            </a:extLst>
+          </p:cNvPr>
+          <p:cNvSpPr>
+            <a:spLocks noGrp="1"/>
+          </p:cNvSpPr>
+          <p:nvPr>
+            <p:ph idx="1"/>
+          </p:nvPr>
+        </p:nvSpPr>
+        <p:spPr/>
+        <p:txBody>
+          <a:bodyPr/>
+          <a:lstStyle/>
+          <a:p>
+            <a:r>
+              <a:rPr lang="da-DK" dirty="0"/>
+              <a:t>Spil logik og validering</a:t>
+            </a:r>
+          </a:p>
+          <a:p>
+            <a:r>
+              <a:rPr lang="da-DK" dirty="0"/>
+              <a:t>Brugergrænseflade</a:t>
+            </a:r>
+          </a:p>
+          <a:p>
+            <a:r>
+              <a:rPr lang="da-DK" dirty="0"/>
+              <a:t>Visuel feedback</a:t>
+            </a:r>
+          </a:p>
+          <a:p>
+            <a:r>
+              <a:rPr lang="da-DK" dirty="0"/>
+              <a:t>Opbevare spillets </a:t>
+            </a:r>
+            <a:r>
+              <a:rPr lang="da-DK" dirty="0" err="1"/>
+              <a:t>state</a:t>
+            </a:r>
+            <a:r>
+              <a:rPr lang="da-DK" dirty="0"/>
+              <a:t> så det kan geninitialiseres</a:t>
+            </a:r>
+          </a:p>
+          <a:p>
+            <a:endParaRPr lang="da-DK" dirty="0"/>
+          </a:p>
+        </p:txBody>
+      </p:sp>
+    </p:spTree>
+    <p:extLst>
+      <p:ext uri="{BB962C8B-B14F-4D97-AF65-F5344CB8AC3E}">
+        <p14:creationId xmlns:p14="http://schemas.microsoft.com/office/powerpoint/2010/main" val="3038215000"/>
+      </p:ext>
+    </p:extLst>
+  </p:cSld>
+  <p:clrMapOvr>
+    <a:masterClrMapping/>
+  </p:clrMapOvr>
+</p:sld>
+</file>
+
+<file path=ppt/slides/slide6.xml><?xml version="1.0" encoding="utf-8"?>
+<p:sld xmlns:a="http://schemas.openxmlformats.org/drawingml/2006/main" xmlns:r="http://schemas.openxmlformats.org/officeDocument/2006/relationships" xmlns:p="http://schemas.openxmlformats.org/presentationml/2006/main">
+  <p:cSld>
+    <p:spTree>
+      <p:nvGrpSpPr>
+        <p:cNvPr id="1" name=""/>
+        <p:cNvGrpSpPr/>
+        <p:nvPr/>
+      </p:nvGrpSpPr>
+      <p:grpSpPr>
+        <a:xfrm>
+          <a:off x="0" y="0"/>
+          <a:ext cx="0" cy="0"/>
+          <a:chOff x="0" y="0"/>
+          <a:chExt cx="0" cy="0"/>
+        </a:xfrm>
+      </p:grpSpPr>
+      <p:sp>
+        <p:nvSpPr>
+          <p:cNvPr id="2" name="Titel 1">
+            <a:extLst>
+              <a:ext uri="{FF2B5EF4-FFF2-40B4-BE49-F238E27FC236}">
                 <a16:creationId xmlns:a16="http://schemas.microsoft.com/office/drawing/2014/main" id="{48D88ED8-93A5-019E-D454-A987B2F69302}"/>
               </a:ext>
             </a:extLst>
@@ -4559,7 +4680,7 @@
 </p:sld>
 </file>
 
-<file path=ppt/slides/slide6.xml><?xml version="1.0" encoding="utf-8"?>
+<file path=ppt/slides/slide7.xml><?xml version="1.0" encoding="utf-8"?>
 <p:sld xmlns:a="http://schemas.openxmlformats.org/drawingml/2006/main" xmlns:r="http://schemas.openxmlformats.org/officeDocument/2006/relationships" xmlns:p="http://schemas.openxmlformats.org/presentationml/2006/main">
   <p:cSld>
     <p:spTree>

</xml_diff>

<commit_message>
Finished for now (#4)
* initial guess typing implementation

* wordlist generation to be uppercase

* implemented main game loop functionality

* implemented feedback

* implemented keyboard

* added some comments to the most complex parts of the keyboard

* slightly smaller enter keyboard button

* cleanup of Keyboard component

* added game won/lost feedback dialogs

* cleanup

* moved word list txt to a designated directory

* changed header title and removed vite icon

* added functionality and get started sections

* similar width of keyboard keys

* better random secret word

* renaming of secretword to solution

* dont include office temp files

* cleanup

* added presentation

* added requirement specifikation to slides

* Updated README
</commit_message>
<xml_diff>
--- a/docs/præsentation.pptx
+++ b/docs/præsentation.pptx
@@ -8,9 +8,10 @@
     <p:sldId id="256" r:id="rId2"/>
     <p:sldId id="260" r:id="rId3"/>
     <p:sldId id="257" r:id="rId4"/>
-    <p:sldId id="258" r:id="rId5"/>
-    <p:sldId id="259" r:id="rId6"/>
-    <p:sldId id="261" r:id="rId7"/>
+    <p:sldId id="262" r:id="rId5"/>
+    <p:sldId id="258" r:id="rId6"/>
+    <p:sldId id="259" r:id="rId7"/>
+    <p:sldId id="261" r:id="rId8"/>
   </p:sldIdLst>
   <p:sldSz cx="12192000" cy="6858000"/>
   <p:notesSz cx="6858000" cy="9144000"/>
@@ -109,6 +110,11 @@
       </a:defRPr>
     </a:lvl9pPr>
   </p:defaultTextStyle>
+  <p:extLst>
+    <p:ext uri="{EFAFB233-063F-42B5-8137-9DF3F51BA10A}">
+      <p15:sldGuideLst xmlns:p15="http://schemas.microsoft.com/office/powerpoint/2012/main"/>
+    </p:ext>
+  </p:extLst>
 </p:presentation>
 </file>
 
@@ -4228,7 +4234,7 @@
           <a:p>
             <a:r>
               <a:rPr lang="da-DK" dirty="0"/>
-              <a:t>Analyse</a:t>
+              <a:t>Undersøgelse</a:t>
             </a:r>
           </a:p>
         </p:txBody>
@@ -4295,36 +4301,6 @@
               <a:rPr lang="da-DK" dirty="0" err="1"/>
               <a:t>state</a:t>
             </a:r>
-            <a:endParaRPr lang="da-DK" dirty="0"/>
-          </a:p>
-          <a:p>
-            <a:r>
-              <a:rPr lang="da-DK" dirty="0"/>
-              <a:t>Udarbejdelse af kravspecifikation</a:t>
-            </a:r>
-          </a:p>
-          <a:p>
-            <a:pPr lvl="1"/>
-            <a:r>
-              <a:rPr lang="da-DK" dirty="0"/>
-              <a:t>Fokus på at dække så meget som muligt</a:t>
-            </a:r>
-          </a:p>
-          <a:p>
-            <a:pPr lvl="1"/>
-            <a:r>
-              <a:rPr lang="da-DK" dirty="0"/>
-              <a:t>Udeladelse af unødvendige features</a:t>
-            </a:r>
-          </a:p>
-          <a:p>
-            <a:pPr lvl="1"/>
-            <a:r>
-              <a:rPr lang="da-DK" dirty="0"/>
-              <a:t>Tilføjelse vigtige krav selv hvis de ikke kan nås</a:t>
-            </a:r>
-          </a:p>
-          <a:p>
             <a:endParaRPr lang="da-DK" dirty="0"/>
           </a:p>
         </p:txBody>
@@ -4364,7 +4340,7 @@
           <p:cNvPr id="2" name="Titel 1">
             <a:extLst>
               <a:ext uri="{FF2B5EF4-FFF2-40B4-BE49-F238E27FC236}">
-                <a16:creationId xmlns:a16="http://schemas.microsoft.com/office/drawing/2014/main" id="{01492D0A-5EDA-84C7-93F9-33CF5E0C9383}"/>
+                <a16:creationId xmlns:a16="http://schemas.microsoft.com/office/drawing/2014/main" id="{9C9E30D4-4F24-CD7D-D5F9-C258B35E7BD4}"/>
               </a:ext>
             </a:extLst>
           </p:cNvPr>
@@ -4382,7 +4358,7 @@
           <a:p>
             <a:r>
               <a:rPr lang="da-DK" dirty="0"/>
-              <a:t>Planlægning</a:t>
+              <a:t>Kravspecifikation</a:t>
             </a:r>
           </a:p>
         </p:txBody>
@@ -4392,7 +4368,7 @@
           <p:cNvPr id="3" name="Pladsholder til indhold 2">
             <a:extLst>
               <a:ext uri="{FF2B5EF4-FFF2-40B4-BE49-F238E27FC236}">
-                <a16:creationId xmlns:a16="http://schemas.microsoft.com/office/drawing/2014/main" id="{817AB306-DC42-2D6A-CB66-5691E1713BCD}"/>
+                <a16:creationId xmlns:a16="http://schemas.microsoft.com/office/drawing/2014/main" id="{5C9BBEAC-5698-573F-8840-6F54282EB5F5}"/>
               </a:ext>
             </a:extLst>
           </p:cNvPr>
@@ -4403,40 +4379,40 @@
             <p:ph idx="1"/>
           </p:nvPr>
         </p:nvSpPr>
-        <p:spPr/>
+        <p:spPr>
+          <a:xfrm>
+            <a:off x="1371600" y="2286000"/>
+            <a:ext cx="4653815" cy="3581400"/>
+          </a:xfrm>
+        </p:spPr>
         <p:txBody>
           <a:bodyPr/>
           <a:lstStyle/>
           <a:p>
             <a:r>
               <a:rPr lang="da-DK" dirty="0"/>
-              <a:t>Spil logik og validering</a:t>
-            </a:r>
-          </a:p>
-          <a:p>
+              <a:t>Udarbejdelse af kravspecifikation</a:t>
+            </a:r>
+          </a:p>
+          <a:p>
+            <a:pPr lvl="1"/>
             <a:r>
               <a:rPr lang="da-DK" dirty="0"/>
-              <a:t>Brugergrænseflade</a:t>
-            </a:r>
-          </a:p>
-          <a:p>
+              <a:t>Fokus på at dække så meget som muligt</a:t>
+            </a:r>
+          </a:p>
+          <a:p>
+            <a:pPr lvl="1"/>
             <a:r>
               <a:rPr lang="da-DK" dirty="0"/>
-              <a:t>Visuel feedback</a:t>
-            </a:r>
-          </a:p>
-          <a:p>
+              <a:t>Udeladelse af unødvendige features</a:t>
+            </a:r>
+          </a:p>
+          <a:p>
+            <a:pPr lvl="1"/>
             <a:r>
               <a:rPr lang="da-DK" dirty="0"/>
-              <a:t>Opbevare spillets </a:t>
-            </a:r>
-            <a:r>
-              <a:rPr lang="da-DK" dirty="0" err="1"/>
-              <a:t>state</a:t>
-            </a:r>
-            <a:r>
-              <a:rPr lang="da-DK" dirty="0"/>
-              <a:t> så det kan geninitialiseres</a:t>
+              <a:t>Tilføjelse vigtige krav selv hvis de ikke kan nås</a:t>
             </a:r>
           </a:p>
           <a:p>
@@ -4444,10 +4420,40 @@
           </a:p>
         </p:txBody>
       </p:sp>
+      <p:pic>
+        <p:nvPicPr>
+          <p:cNvPr id="9" name="Billede 8">
+            <a:extLst>
+              <a:ext uri="{FF2B5EF4-FFF2-40B4-BE49-F238E27FC236}">
+                <a16:creationId xmlns:a16="http://schemas.microsoft.com/office/drawing/2014/main" id="{C1B49A8F-5730-50BE-152A-6C9FF1ADE338}"/>
+              </a:ext>
+            </a:extLst>
+          </p:cNvPr>
+          <p:cNvPicPr>
+            <a:picLocks noChangeAspect="1"/>
+          </p:cNvPicPr>
+          <p:nvPr/>
+        </p:nvPicPr>
+        <p:blipFill>
+          <a:blip r:embed="rId2"/>
+          <a:stretch>
+            <a:fillRect/>
+          </a:stretch>
+        </p:blipFill>
+        <p:spPr>
+          <a:xfrm>
+            <a:off x="6166587" y="2267056"/>
+            <a:ext cx="5202711" cy="3581401"/>
+          </a:xfrm>
+          <a:prstGeom prst="rect">
+            <a:avLst/>
+          </a:prstGeom>
+        </p:spPr>
+      </p:pic>
     </p:spTree>
     <p:extLst>
       <p:ext uri="{BB962C8B-B14F-4D97-AF65-F5344CB8AC3E}">
-        <p14:creationId xmlns:p14="http://schemas.microsoft.com/office/powerpoint/2010/main" val="3038215000"/>
+        <p14:creationId xmlns:p14="http://schemas.microsoft.com/office/powerpoint/2010/main" val="568693251"/>
       </p:ext>
     </p:extLst>
   </p:cSld>
@@ -4479,6 +4485,121 @@
           <p:cNvPr id="2" name="Titel 1">
             <a:extLst>
               <a:ext uri="{FF2B5EF4-FFF2-40B4-BE49-F238E27FC236}">
+                <a16:creationId xmlns:a16="http://schemas.microsoft.com/office/drawing/2014/main" id="{01492D0A-5EDA-84C7-93F9-33CF5E0C9383}"/>
+              </a:ext>
+            </a:extLst>
+          </p:cNvPr>
+          <p:cNvSpPr>
+            <a:spLocks noGrp="1"/>
+          </p:cNvSpPr>
+          <p:nvPr>
+            <p:ph type="title"/>
+          </p:nvPr>
+        </p:nvSpPr>
+        <p:spPr/>
+        <p:txBody>
+          <a:bodyPr/>
+          <a:lstStyle/>
+          <a:p>
+            <a:r>
+              <a:rPr lang="da-DK" dirty="0"/>
+              <a:t>Planlægning</a:t>
+            </a:r>
+          </a:p>
+        </p:txBody>
+      </p:sp>
+      <p:sp>
+        <p:nvSpPr>
+          <p:cNvPr id="3" name="Pladsholder til indhold 2">
+            <a:extLst>
+              <a:ext uri="{FF2B5EF4-FFF2-40B4-BE49-F238E27FC236}">
+                <a16:creationId xmlns:a16="http://schemas.microsoft.com/office/drawing/2014/main" id="{817AB306-DC42-2D6A-CB66-5691E1713BCD}"/>
+              </a:ext>
+            </a:extLst>
+          </p:cNvPr>
+          <p:cNvSpPr>
+            <a:spLocks noGrp="1"/>
+          </p:cNvSpPr>
+          <p:nvPr>
+            <p:ph idx="1"/>
+          </p:nvPr>
+        </p:nvSpPr>
+        <p:spPr/>
+        <p:txBody>
+          <a:bodyPr/>
+          <a:lstStyle/>
+          <a:p>
+            <a:r>
+              <a:rPr lang="da-DK" dirty="0"/>
+              <a:t>Spil logik og validering</a:t>
+            </a:r>
+          </a:p>
+          <a:p>
+            <a:r>
+              <a:rPr lang="da-DK" dirty="0"/>
+              <a:t>Brugergrænseflade</a:t>
+            </a:r>
+          </a:p>
+          <a:p>
+            <a:r>
+              <a:rPr lang="da-DK" dirty="0"/>
+              <a:t>Visuel feedback</a:t>
+            </a:r>
+          </a:p>
+          <a:p>
+            <a:r>
+              <a:rPr lang="da-DK" dirty="0"/>
+              <a:t>Opbevare spillets </a:t>
+            </a:r>
+            <a:r>
+              <a:rPr lang="da-DK" dirty="0" err="1"/>
+              <a:t>state</a:t>
+            </a:r>
+            <a:r>
+              <a:rPr lang="da-DK" dirty="0"/>
+              <a:t> så det kan geninitialiseres</a:t>
+            </a:r>
+          </a:p>
+          <a:p>
+            <a:endParaRPr lang="da-DK" dirty="0"/>
+          </a:p>
+        </p:txBody>
+      </p:sp>
+    </p:spTree>
+    <p:extLst>
+      <p:ext uri="{BB962C8B-B14F-4D97-AF65-F5344CB8AC3E}">
+        <p14:creationId xmlns:p14="http://schemas.microsoft.com/office/powerpoint/2010/main" val="3038215000"/>
+      </p:ext>
+    </p:extLst>
+  </p:cSld>
+  <p:clrMapOvr>
+    <a:masterClrMapping/>
+  </p:clrMapOvr>
+</p:sld>
+</file>
+
+<file path=ppt/slides/slide6.xml><?xml version="1.0" encoding="utf-8"?>
+<p:sld xmlns:a="http://schemas.openxmlformats.org/drawingml/2006/main" xmlns:r="http://schemas.openxmlformats.org/officeDocument/2006/relationships" xmlns:p="http://schemas.openxmlformats.org/presentationml/2006/main">
+  <p:cSld>
+    <p:spTree>
+      <p:nvGrpSpPr>
+        <p:cNvPr id="1" name=""/>
+        <p:cNvGrpSpPr/>
+        <p:nvPr/>
+      </p:nvGrpSpPr>
+      <p:grpSpPr>
+        <a:xfrm>
+          <a:off x="0" y="0"/>
+          <a:ext cx="0" cy="0"/>
+          <a:chOff x="0" y="0"/>
+          <a:chExt cx="0" cy="0"/>
+        </a:xfrm>
+      </p:grpSpPr>
+      <p:sp>
+        <p:nvSpPr>
+          <p:cNvPr id="2" name="Titel 1">
+            <a:extLst>
+              <a:ext uri="{FF2B5EF4-FFF2-40B4-BE49-F238E27FC236}">
                 <a16:creationId xmlns:a16="http://schemas.microsoft.com/office/drawing/2014/main" id="{48D88ED8-93A5-019E-D454-A987B2F69302}"/>
               </a:ext>
             </a:extLst>
@@ -4559,7 +4680,7 @@
 </p:sld>
 </file>
 
-<file path=ppt/slides/slide6.xml><?xml version="1.0" encoding="utf-8"?>
+<file path=ppt/slides/slide7.xml><?xml version="1.0" encoding="utf-8"?>
 <p:sld xmlns:a="http://schemas.openxmlformats.org/drawingml/2006/main" xmlns:r="http://schemas.openxmlformats.org/officeDocument/2006/relationships" xmlns:p="http://schemas.openxmlformats.org/presentationml/2006/main">
   <p:cSld>
     <p:spTree>

</xml_diff>